<commit_message>
tweaks from Nov 22 delivery
</commit_message>
<xml_diff>
--- a/instructors/10-Reusable-analysis.pptx
+++ b/instructors/10-Reusable-analysis.pptx
@@ -215,7 +215,7 @@
           <a:p>
             <a:fld id="{585C48AE-4A1E-9A43-835F-510354165F99}" type="datetimeFigureOut">
               <a:rPr lang="en-GB" smtClean="0"/>
-              <a:t>20/10/2021</a:t>
+              <a:t>23/11/2022</a:t>
             </a:fld>
             <a:endParaRPr lang="en-GB" dirty="0"/>
           </a:p>
@@ -799,7 +799,7 @@
           <a:p>
             <a:fld id="{5913FB77-D8DB-4AB9-8EA5-EE8C3B57A5E1}" type="datetimeFigureOut">
               <a:rPr lang="en-GB" smtClean="0"/>
-              <a:t>20/10/2021</a:t>
+              <a:t>23/11/2022</a:t>
             </a:fld>
             <a:endParaRPr lang="en-GB" dirty="0"/>
           </a:p>
@@ -999,7 +999,7 @@
           <a:p>
             <a:fld id="{5913FB77-D8DB-4AB9-8EA5-EE8C3B57A5E1}" type="datetimeFigureOut">
               <a:rPr lang="en-GB" smtClean="0"/>
-              <a:t>20/10/2021</a:t>
+              <a:t>23/11/2022</a:t>
             </a:fld>
             <a:endParaRPr lang="en-GB" dirty="0"/>
           </a:p>
@@ -1209,7 +1209,7 @@
           <a:p>
             <a:fld id="{5913FB77-D8DB-4AB9-8EA5-EE8C3B57A5E1}" type="datetimeFigureOut">
               <a:rPr lang="en-GB" smtClean="0"/>
-              <a:t>20/10/2021</a:t>
+              <a:t>23/11/2022</a:t>
             </a:fld>
             <a:endParaRPr lang="en-GB" dirty="0"/>
           </a:p>
@@ -1409,7 +1409,7 @@
           <a:p>
             <a:fld id="{5913FB77-D8DB-4AB9-8EA5-EE8C3B57A5E1}" type="datetimeFigureOut">
               <a:rPr lang="en-GB" smtClean="0"/>
-              <a:t>20/10/2021</a:t>
+              <a:t>23/11/2022</a:t>
             </a:fld>
             <a:endParaRPr lang="en-GB" dirty="0"/>
           </a:p>
@@ -1685,7 +1685,7 @@
           <a:p>
             <a:fld id="{5913FB77-D8DB-4AB9-8EA5-EE8C3B57A5E1}" type="datetimeFigureOut">
               <a:rPr lang="en-GB" smtClean="0"/>
-              <a:t>20/10/2021</a:t>
+              <a:t>23/11/2022</a:t>
             </a:fld>
             <a:endParaRPr lang="en-GB" dirty="0"/>
           </a:p>
@@ -1953,7 +1953,7 @@
           <a:p>
             <a:fld id="{5913FB77-D8DB-4AB9-8EA5-EE8C3B57A5E1}" type="datetimeFigureOut">
               <a:rPr lang="en-GB" smtClean="0"/>
-              <a:t>20/10/2021</a:t>
+              <a:t>23/11/2022</a:t>
             </a:fld>
             <a:endParaRPr lang="en-GB" dirty="0"/>
           </a:p>
@@ -2368,7 +2368,7 @@
           <a:p>
             <a:fld id="{5913FB77-D8DB-4AB9-8EA5-EE8C3B57A5E1}" type="datetimeFigureOut">
               <a:rPr lang="en-GB" smtClean="0"/>
-              <a:t>20/10/2021</a:t>
+              <a:t>23/11/2022</a:t>
             </a:fld>
             <a:endParaRPr lang="en-GB" dirty="0"/>
           </a:p>
@@ -2510,7 +2510,7 @@
           <a:p>
             <a:fld id="{5913FB77-D8DB-4AB9-8EA5-EE8C3B57A5E1}" type="datetimeFigureOut">
               <a:rPr lang="en-GB" smtClean="0"/>
-              <a:t>20/10/2021</a:t>
+              <a:t>23/11/2022</a:t>
             </a:fld>
             <a:endParaRPr lang="en-GB" dirty="0"/>
           </a:p>
@@ -2623,7 +2623,7 @@
           <a:p>
             <a:fld id="{5913FB77-D8DB-4AB9-8EA5-EE8C3B57A5E1}" type="datetimeFigureOut">
               <a:rPr lang="en-GB" smtClean="0"/>
-              <a:t>20/10/2021</a:t>
+              <a:t>23/11/2022</a:t>
             </a:fld>
             <a:endParaRPr lang="en-GB" dirty="0"/>
           </a:p>
@@ -2936,7 +2936,7 @@
           <a:p>
             <a:fld id="{5913FB77-D8DB-4AB9-8EA5-EE8C3B57A5E1}" type="datetimeFigureOut">
               <a:rPr lang="en-GB" smtClean="0"/>
-              <a:t>20/10/2021</a:t>
+              <a:t>23/11/2022</a:t>
             </a:fld>
             <a:endParaRPr lang="en-GB" dirty="0"/>
           </a:p>
@@ -3225,7 +3225,7 @@
           <a:p>
             <a:fld id="{5913FB77-D8DB-4AB9-8EA5-EE8C3B57A5E1}" type="datetimeFigureOut">
               <a:rPr lang="en-GB" smtClean="0"/>
-              <a:t>20/10/2021</a:t>
+              <a:t>23/11/2022</a:t>
             </a:fld>
             <a:endParaRPr lang="en-GB" dirty="0"/>
           </a:p>
@@ -3468,7 +3468,7 @@
           <a:p>
             <a:fld id="{5913FB77-D8DB-4AB9-8EA5-EE8C3B57A5E1}" type="datetimeFigureOut">
               <a:rPr lang="en-GB" smtClean="0"/>
-              <a:t>20/10/2021</a:t>
+              <a:t>23/11/2022</a:t>
             </a:fld>
             <a:endParaRPr lang="en-GB" dirty="0"/>
           </a:p>
@@ -4561,7 +4561,7 @@
           <p:nvPr/>
         </p:nvPicPr>
         <p:blipFill>
-          <a:blip r:embed="rId4"/>
+          <a:blip r:embed="rId3"/>
           <a:stretch>
             <a:fillRect/>
           </a:stretch>
@@ -4604,12 +4604,12 @@
           <a:graphicData uri="http://schemas.openxmlformats.org/presentationml/2006/ole">
             <mc:AlternateContent xmlns:mc="http://schemas.openxmlformats.org/markup-compatibility/2006">
               <mc:Choice xmlns:v="urn:schemas-microsoft-com:vml" Requires="v">
-                <p:oleObj spid="_x0000_s2055" name="Image" r:id="rId5" imgW="4926984" imgH="6171429" progId="Photoshop.Image.11">
+                <p:oleObj name="Image" r:id="rId4" imgW="4926984" imgH="6171429" progId="Photoshop.Image.11">
                   <p:embed/>
                 </p:oleObj>
               </mc:Choice>
               <mc:Fallback>
-                <p:oleObj name="Image" r:id="rId5" imgW="4926984" imgH="6171429" progId="Photoshop.Image.11">
+                <p:oleObj name="Image" r:id="rId4" imgW="4926984" imgH="6171429" progId="Photoshop.Image.11">
                   <p:embed/>
                   <p:pic>
                     <p:nvPicPr>
@@ -4626,7 +4626,7 @@
                       <p:nvPr/>
                     </p:nvPicPr>
                     <p:blipFill>
-                      <a:blip r:embed="rId6">
+                      <a:blip r:embed="rId5">
                         <a:extLst>
                           <a:ext uri="{28A0092B-C50C-407E-A947-70E740481C1C}">
                             <a14:useLocalDpi xmlns:a14="http://schemas.microsoft.com/office/drawing/2010/main" val="0"/>
@@ -4702,7 +4702,7 @@
           <p:nvPr/>
         </p:nvPicPr>
         <p:blipFill>
-          <a:blip r:embed="rId7" cstate="hqprint">
+          <a:blip r:embed="rId6" cstate="hqprint">
             <a:extLst>
               <a:ext uri="{28A0092B-C50C-407E-A947-70E740481C1C}">
                 <a14:useLocalDpi xmlns:a14="http://schemas.microsoft.com/office/drawing/2010/main" val="0"/>
@@ -4793,7 +4793,7 @@
           <p:nvPr/>
         </p:nvPicPr>
         <p:blipFill>
-          <a:blip r:embed="rId8" cstate="hqprint">
+          <a:blip r:embed="rId7" cstate="hqprint">
             <a:extLst>
               <a:ext uri="{28A0092B-C50C-407E-A947-70E740481C1C}">
                 <a14:useLocalDpi xmlns:a14="http://schemas.microsoft.com/office/drawing/2010/main" val="0"/>
@@ -4842,12 +4842,12 @@
           <a:graphicData uri="http://schemas.openxmlformats.org/presentationml/2006/ole">
             <mc:AlternateContent xmlns:mc="http://schemas.openxmlformats.org/markup-compatibility/2006">
               <mc:Choice xmlns:v="urn:schemas-microsoft-com:vml" Requires="v">
-                <p:oleObj spid="_x0000_s2056" name="Image" r:id="rId9" imgW="4926984" imgH="6171429" progId="Photoshop.Image.11">
+                <p:oleObj name="Image" r:id="rId8" imgW="4926984" imgH="6171429" progId="Photoshop.Image.11">
                   <p:embed/>
                 </p:oleObj>
               </mc:Choice>
               <mc:Fallback>
-                <p:oleObj name="Image" r:id="rId9" imgW="4926984" imgH="6171429" progId="Photoshop.Image.11">
+                <p:oleObj name="Image" r:id="rId8" imgW="4926984" imgH="6171429" progId="Photoshop.Image.11">
                   <p:embed/>
                   <p:pic>
                     <p:nvPicPr>
@@ -4864,7 +4864,7 @@
                       <p:nvPr/>
                     </p:nvPicPr>
                     <p:blipFill>
-                      <a:blip r:embed="rId6">
+                      <a:blip r:embed="rId5">
                         <a:extLst>
                           <a:ext uri="{28A0092B-C50C-407E-A947-70E740481C1C}">
                             <a14:useLocalDpi xmlns:a14="http://schemas.microsoft.com/office/drawing/2010/main" val="0"/>
@@ -4940,7 +4940,7 @@
           <p:nvPr/>
         </p:nvPicPr>
         <p:blipFill rotWithShape="1">
-          <a:blip r:embed="rId10">
+          <a:blip r:embed="rId9">
             <a:clrChange>
               <a:clrFrom>
                 <a:srgbClr val="FFFFFF"/>
@@ -5128,7 +5128,7 @@
           <p:nvPr/>
         </p:nvPicPr>
         <p:blipFill>
-          <a:blip r:embed="rId11"/>
+          <a:blip r:embed="rId10"/>
           <a:stretch>
             <a:fillRect/>
           </a:stretch>
@@ -5163,7 +5163,7 @@
           <p:nvPr/>
         </p:nvPicPr>
         <p:blipFill>
-          <a:blip r:embed="rId12"/>
+          <a:blip r:embed="rId11"/>
           <a:stretch>
             <a:fillRect/>
           </a:stretch>
@@ -5239,7 +5239,7 @@
           <p:nvPr/>
         </p:nvPicPr>
         <p:blipFill>
-          <a:blip r:embed="rId13" cstate="hqprint">
+          <a:blip r:embed="rId12" cstate="hqprint">
             <a:extLst>
               <a:ext uri="{28A0092B-C50C-407E-A947-70E740481C1C}">
                 <a14:useLocalDpi xmlns:a14="http://schemas.microsoft.com/office/drawing/2010/main" val="0"/>
@@ -5275,7 +5275,7 @@
           <p:nvPr/>
         </p:nvPicPr>
         <p:blipFill>
-          <a:blip r:embed="rId4"/>
+          <a:blip r:embed="rId3"/>
           <a:stretch>
             <a:fillRect/>
           </a:stretch>
@@ -5318,12 +5318,12 @@
           <a:graphicData uri="http://schemas.openxmlformats.org/presentationml/2006/ole">
             <mc:AlternateContent xmlns:mc="http://schemas.openxmlformats.org/markup-compatibility/2006">
               <mc:Choice xmlns:v="urn:schemas-microsoft-com:vml" Requires="v">
-                <p:oleObj spid="_x0000_s2057" name="Image" r:id="rId14" imgW="4926984" imgH="6171429" progId="Photoshop.Image.11">
+                <p:oleObj name="Image" r:id="rId13" imgW="4926984" imgH="6171429" progId="Photoshop.Image.11">
                   <p:embed/>
                 </p:oleObj>
               </mc:Choice>
               <mc:Fallback>
-                <p:oleObj name="Image" r:id="rId14" imgW="4926984" imgH="6171429" progId="Photoshop.Image.11">
+                <p:oleObj name="Image" r:id="rId13" imgW="4926984" imgH="6171429" progId="Photoshop.Image.11">
                   <p:embed/>
                   <p:pic>
                     <p:nvPicPr>
@@ -5340,7 +5340,7 @@
                       <p:nvPr/>
                     </p:nvPicPr>
                     <p:blipFill>
-                      <a:blip r:embed="rId6">
+                      <a:blip r:embed="rId5">
                         <a:extLst>
                           <a:ext uri="{28A0092B-C50C-407E-A947-70E740481C1C}">
                             <a14:useLocalDpi xmlns:a14="http://schemas.microsoft.com/office/drawing/2010/main" val="0"/>
@@ -5416,7 +5416,7 @@
           <p:nvPr/>
         </p:nvPicPr>
         <p:blipFill>
-          <a:blip r:embed="rId8" cstate="hqprint">
+          <a:blip r:embed="rId7" cstate="hqprint">
             <a:extLst>
               <a:ext uri="{28A0092B-C50C-407E-A947-70E740481C1C}">
                 <a14:useLocalDpi xmlns:a14="http://schemas.microsoft.com/office/drawing/2010/main" val="0"/>
@@ -5465,12 +5465,12 @@
           <a:graphicData uri="http://schemas.openxmlformats.org/presentationml/2006/ole">
             <mc:AlternateContent xmlns:mc="http://schemas.openxmlformats.org/markup-compatibility/2006">
               <mc:Choice xmlns:v="urn:schemas-microsoft-com:vml" Requires="v">
-                <p:oleObj spid="_x0000_s2058" name="Image" r:id="rId9" imgW="4926984" imgH="6171429" progId="Photoshop.Image.11">
+                <p:oleObj name="Image" r:id="rId8" imgW="4926984" imgH="6171429" progId="Photoshop.Image.11">
                   <p:embed/>
                 </p:oleObj>
               </mc:Choice>
               <mc:Fallback>
-                <p:oleObj name="Image" r:id="rId9" imgW="4926984" imgH="6171429" progId="Photoshop.Image.11">
+                <p:oleObj name="Image" r:id="rId8" imgW="4926984" imgH="6171429" progId="Photoshop.Image.11">
                   <p:embed/>
                   <p:pic>
                     <p:nvPicPr>
@@ -5487,7 +5487,7 @@
                       <p:nvPr/>
                     </p:nvPicPr>
                     <p:blipFill>
-                      <a:blip r:embed="rId6">
+                      <a:blip r:embed="rId5">
                         <a:extLst>
                           <a:ext uri="{28A0092B-C50C-407E-A947-70E740481C1C}">
                             <a14:useLocalDpi xmlns:a14="http://schemas.microsoft.com/office/drawing/2010/main" val="0"/>
@@ -5563,7 +5563,7 @@
           <p:nvPr/>
         </p:nvPicPr>
         <p:blipFill rotWithShape="1">
-          <a:blip r:embed="rId10">
+          <a:blip r:embed="rId9">
             <a:clrChange>
               <a:clrFrom>
                 <a:srgbClr val="FFFFFF"/>
@@ -5797,7 +5797,7 @@
           <p:nvPr/>
         </p:nvPicPr>
         <p:blipFill>
-          <a:blip r:embed="rId15">
+          <a:blip r:embed="rId14">
             <a:extLst>
               <a:ext uri="{28A0092B-C50C-407E-A947-70E740481C1C}">
                 <a14:useLocalDpi xmlns:a14="http://schemas.microsoft.com/office/drawing/2010/main" val="0"/>
@@ -6211,6 +6211,22 @@
               </a:rPr>
               <a:t>pipeline</a:t>
             </a:r>
+            <a:r>
+              <a:rPr lang="pl-PL" dirty="0">
+                <a:solidFill>
+                  <a:srgbClr val="0070C0"/>
+                </a:solidFill>
+              </a:rPr>
+              <a:t> - </a:t>
+            </a:r>
+            <a:r>
+              <a:rPr lang="pl-PL" dirty="0" err="1">
+                <a:solidFill>
+                  <a:srgbClr val="0070C0"/>
+                </a:solidFill>
+              </a:rPr>
+              <a:t>requirements</a:t>
+            </a:r>
             <a:endParaRPr lang="en-GB" dirty="0">
               <a:solidFill>
                 <a:srgbClr val="0070C0"/>
@@ -8019,7 +8035,7 @@
         <p:spPr>
           <a:xfrm>
             <a:off x="1138104" y="1569406"/>
-            <a:ext cx="9682566" cy="5262979"/>
+            <a:ext cx="9682566" cy="4832092"/>
           </a:xfrm>
           <a:prstGeom prst="rect">
             <a:avLst/>
@@ -8458,7 +8474,55 @@
                   <a:srgbClr val="0070C0"/>
                 </a:solidFill>
               </a:rPr>
-              <a:t>: R, </a:t>
+              <a:t>: </a:t>
+            </a:r>
+            <a:r>
+              <a:rPr lang="pl-PL" sz="2800" dirty="0" err="1">
+                <a:solidFill>
+                  <a:srgbClr val="0070C0"/>
+                </a:solidFill>
+              </a:rPr>
+              <a:t>Python</a:t>
+            </a:r>
+            <a:r>
+              <a:rPr lang="pl-PL" sz="2800" dirty="0">
+                <a:solidFill>
+                  <a:srgbClr val="0070C0"/>
+                </a:solidFill>
+              </a:rPr>
+              <a:t>, R(</a:t>
+            </a:r>
+            <a:r>
+              <a:rPr lang="pl-PL" sz="2800" dirty="0" err="1">
+                <a:solidFill>
+                  <a:srgbClr val="0070C0"/>
+                </a:solidFill>
+              </a:rPr>
+              <a:t>actually</a:t>
+            </a:r>
+            <a:r>
+              <a:rPr lang="pl-PL" sz="2800" dirty="0">
+                <a:solidFill>
+                  <a:srgbClr val="0070C0"/>
+                </a:solidFill>
+              </a:rPr>
+              <a:t> </a:t>
+            </a:r>
+            <a:r>
+              <a:rPr lang="pl-PL" sz="2800" dirty="0" err="1">
+                <a:solidFill>
+                  <a:srgbClr val="0070C0"/>
+                </a:solidFill>
+              </a:rPr>
+              <a:t>renv</a:t>
+            </a:r>
+            <a:r>
+              <a:rPr lang="pl-PL" sz="2800" dirty="0">
+                <a:solidFill>
+                  <a:srgbClr val="0070C0"/>
+                </a:solidFill>
+              </a:rPr>
+              <a:t> for R), </a:t>
             </a:r>
             <a:r>
               <a:rPr lang="pl-PL" sz="2800" dirty="0" err="1">
@@ -8492,13 +8556,6 @@
               </a:rPr>
               <a:t>, Scala, Java, JavaScript, C, C++, FORTRAN.</a:t>
             </a:r>
-          </a:p>
-          <a:p>
-            <a:endParaRPr lang="pl-PL" sz="2800" dirty="0">
-              <a:solidFill>
-                <a:srgbClr val="0070C0"/>
-              </a:solidFill>
-            </a:endParaRPr>
           </a:p>
         </p:txBody>
       </p:sp>
@@ -9528,12 +9585,12 @@
           <a:graphicData uri="http://schemas.openxmlformats.org/presentationml/2006/ole">
             <mc:AlternateContent xmlns:mc="http://schemas.openxmlformats.org/markup-compatibility/2006">
               <mc:Choice xmlns:v="urn:schemas-microsoft-com:vml" Requires="v">
-                <p:oleObj spid="_x0000_s7171" name="Image" r:id="rId4" imgW="4926984" imgH="6171429" progId="Photoshop.Image.11">
+                <p:oleObj name="Image" r:id="rId3" imgW="4926984" imgH="6171429" progId="Photoshop.Image.11">
                   <p:embed/>
                 </p:oleObj>
               </mc:Choice>
               <mc:Fallback>
-                <p:oleObj name="Image" r:id="rId4" imgW="4926984" imgH="6171429" progId="Photoshop.Image.11">
+                <p:oleObj name="Image" r:id="rId3" imgW="4926984" imgH="6171429" progId="Photoshop.Image.11">
                   <p:embed/>
                   <p:pic>
                     <p:nvPicPr>
@@ -9550,7 +9607,7 @@
                       <p:nvPr/>
                     </p:nvPicPr>
                     <p:blipFill>
-                      <a:blip r:embed="rId5">
+                      <a:blip r:embed="rId4">
                         <a:extLst>
                           <a:ext uri="{28A0092B-C50C-407E-A947-70E740481C1C}">
                             <a14:useLocalDpi xmlns:a14="http://schemas.microsoft.com/office/drawing/2010/main" val="0"/>
@@ -9626,7 +9683,7 @@
           <p:nvPr/>
         </p:nvPicPr>
         <p:blipFill>
-          <a:blip r:embed="rId6" cstate="hqprint">
+          <a:blip r:embed="rId5" cstate="hqprint">
             <a:extLst>
               <a:ext uri="{28A0092B-C50C-407E-A947-70E740481C1C}">
                 <a14:useLocalDpi xmlns:a14="http://schemas.microsoft.com/office/drawing/2010/main" val="0"/>
@@ -9717,7 +9774,7 @@
           <p:nvPr/>
         </p:nvPicPr>
         <p:blipFill>
-          <a:blip r:embed="rId7" cstate="hqprint">
+          <a:blip r:embed="rId6" cstate="hqprint">
             <a:extLst>
               <a:ext uri="{28A0092B-C50C-407E-A947-70E740481C1C}">
                 <a14:useLocalDpi xmlns:a14="http://schemas.microsoft.com/office/drawing/2010/main" val="0"/>
@@ -9753,7 +9810,7 @@
           <p:nvPr/>
         </p:nvPicPr>
         <p:blipFill>
-          <a:blip r:embed="rId8" cstate="hqprint">
+          <a:blip r:embed="rId7" cstate="hqprint">
             <a:extLst>
               <a:ext uri="{28A0092B-C50C-407E-A947-70E740481C1C}">
                 <a14:useLocalDpi xmlns:a14="http://schemas.microsoft.com/office/drawing/2010/main" val="0"/>
@@ -9802,12 +9859,12 @@
           <a:graphicData uri="http://schemas.openxmlformats.org/presentationml/2006/ole">
             <mc:AlternateContent xmlns:mc="http://schemas.openxmlformats.org/markup-compatibility/2006">
               <mc:Choice xmlns:v="urn:schemas-microsoft-com:vml" Requires="v">
-                <p:oleObj spid="_x0000_s7172" name="Image" r:id="rId9" imgW="4926984" imgH="6171429" progId="Photoshop.Image.11">
+                <p:oleObj name="Image" r:id="rId8" imgW="4926984" imgH="6171429" progId="Photoshop.Image.11">
                   <p:embed/>
                 </p:oleObj>
               </mc:Choice>
               <mc:Fallback>
-                <p:oleObj name="Image" r:id="rId9" imgW="4926984" imgH="6171429" progId="Photoshop.Image.11">
+                <p:oleObj name="Image" r:id="rId8" imgW="4926984" imgH="6171429" progId="Photoshop.Image.11">
                   <p:embed/>
                   <p:pic>
                     <p:nvPicPr>
@@ -9818,7 +9875,7 @@
                       <p:nvPr/>
                     </p:nvPicPr>
                     <p:blipFill>
-                      <a:blip r:embed="rId5">
+                      <a:blip r:embed="rId4">
                         <a:extLst>
                           <a:ext uri="{28A0092B-C50C-407E-A947-70E740481C1C}">
                             <a14:useLocalDpi xmlns:a14="http://schemas.microsoft.com/office/drawing/2010/main" val="0"/>
@@ -9894,7 +9951,7 @@
           <p:nvPr/>
         </p:nvPicPr>
         <p:blipFill>
-          <a:blip r:embed="rId10" cstate="print">
+          <a:blip r:embed="rId9" cstate="print">
             <a:extLst>
               <a:ext uri="{28A0092B-C50C-407E-A947-70E740481C1C}">
                 <a14:useLocalDpi xmlns:a14="http://schemas.microsoft.com/office/drawing/2010/main" val="0"/>
@@ -9930,7 +9987,7 @@
           <p:nvPr/>
         </p:nvPicPr>
         <p:blipFill rotWithShape="1">
-          <a:blip r:embed="rId11">
+          <a:blip r:embed="rId10">
             <a:clrChange>
               <a:clrFrom>
                 <a:srgbClr val="FFFFFF"/>
@@ -10378,7 +10435,7 @@
           <p:nvPr/>
         </p:nvPicPr>
         <p:blipFill rotWithShape="1">
-          <a:blip r:embed="rId11">
+          <a:blip r:embed="rId10">
             <a:clrChange>
               <a:clrFrom>
                 <a:srgbClr val="FFFFFF"/>
@@ -10419,7 +10476,7 @@
           <p:nvPr/>
         </p:nvPicPr>
         <p:blipFill rotWithShape="1">
-          <a:blip r:embed="rId11">
+          <a:blip r:embed="rId10">
             <a:clrChange>
               <a:clrFrom>
                 <a:srgbClr val="FFFFFF"/>
@@ -10460,7 +10517,7 @@
           <p:nvPr/>
         </p:nvPicPr>
         <p:blipFill rotWithShape="1">
-          <a:blip r:embed="rId11">
+          <a:blip r:embed="rId10">
             <a:clrChange>
               <a:clrFrom>
                 <a:srgbClr val="FFFFFF"/>
@@ -10547,7 +10604,7 @@
           <p:nvPr/>
         </p:nvPicPr>
         <p:blipFill>
-          <a:blip r:embed="rId12"/>
+          <a:blip r:embed="rId11"/>
           <a:stretch>
             <a:fillRect/>
           </a:stretch>
@@ -10577,7 +10634,7 @@
           <p:nvPr/>
         </p:nvPicPr>
         <p:blipFill>
-          <a:blip r:embed="rId13"/>
+          <a:blip r:embed="rId12"/>
           <a:stretch>
             <a:fillRect/>
           </a:stretch>
@@ -10612,7 +10669,7 @@
           <p:nvPr/>
         </p:nvPicPr>
         <p:blipFill>
-          <a:blip r:embed="rId14"/>
+          <a:blip r:embed="rId13"/>
           <a:stretch>
             <a:fillRect/>
           </a:stretch>

</xml_diff>

<commit_message>
Removed code good practices from computing text
</commit_message>
<xml_diff>
--- a/instructors/10-Reusable-analysis.pptx
+++ b/instructors/10-Reusable-analysis.pptx
@@ -215,7 +215,7 @@
           <a:p>
             <a:fld id="{585C48AE-4A1E-9A43-835F-510354165F99}" type="datetimeFigureOut">
               <a:rPr lang="en-GB" smtClean="0"/>
-              <a:t>14/12/2022</a:t>
+              <a:t>17/01/2023</a:t>
             </a:fld>
             <a:endParaRPr lang="en-GB" dirty="0"/>
           </a:p>
@@ -799,7 +799,7 @@
           <a:p>
             <a:fld id="{5913FB77-D8DB-4AB9-8EA5-EE8C3B57A5E1}" type="datetimeFigureOut">
               <a:rPr lang="en-GB" smtClean="0"/>
-              <a:t>14/12/2022</a:t>
+              <a:t>17/01/2023</a:t>
             </a:fld>
             <a:endParaRPr lang="en-GB" dirty="0"/>
           </a:p>
@@ -999,7 +999,7 @@
           <a:p>
             <a:fld id="{5913FB77-D8DB-4AB9-8EA5-EE8C3B57A5E1}" type="datetimeFigureOut">
               <a:rPr lang="en-GB" smtClean="0"/>
-              <a:t>14/12/2022</a:t>
+              <a:t>17/01/2023</a:t>
             </a:fld>
             <a:endParaRPr lang="en-GB" dirty="0"/>
           </a:p>
@@ -1209,7 +1209,7 @@
           <a:p>
             <a:fld id="{5913FB77-D8DB-4AB9-8EA5-EE8C3B57A5E1}" type="datetimeFigureOut">
               <a:rPr lang="en-GB" smtClean="0"/>
-              <a:t>14/12/2022</a:t>
+              <a:t>17/01/2023</a:t>
             </a:fld>
             <a:endParaRPr lang="en-GB" dirty="0"/>
           </a:p>
@@ -1409,7 +1409,7 @@
           <a:p>
             <a:fld id="{5913FB77-D8DB-4AB9-8EA5-EE8C3B57A5E1}" type="datetimeFigureOut">
               <a:rPr lang="en-GB" smtClean="0"/>
-              <a:t>14/12/2022</a:t>
+              <a:t>17/01/2023</a:t>
             </a:fld>
             <a:endParaRPr lang="en-GB" dirty="0"/>
           </a:p>
@@ -1685,7 +1685,7 @@
           <a:p>
             <a:fld id="{5913FB77-D8DB-4AB9-8EA5-EE8C3B57A5E1}" type="datetimeFigureOut">
               <a:rPr lang="en-GB" smtClean="0"/>
-              <a:t>14/12/2022</a:t>
+              <a:t>17/01/2023</a:t>
             </a:fld>
             <a:endParaRPr lang="en-GB" dirty="0"/>
           </a:p>
@@ -1953,7 +1953,7 @@
           <a:p>
             <a:fld id="{5913FB77-D8DB-4AB9-8EA5-EE8C3B57A5E1}" type="datetimeFigureOut">
               <a:rPr lang="en-GB" smtClean="0"/>
-              <a:t>14/12/2022</a:t>
+              <a:t>17/01/2023</a:t>
             </a:fld>
             <a:endParaRPr lang="en-GB" dirty="0"/>
           </a:p>
@@ -2368,7 +2368,7 @@
           <a:p>
             <a:fld id="{5913FB77-D8DB-4AB9-8EA5-EE8C3B57A5E1}" type="datetimeFigureOut">
               <a:rPr lang="en-GB" smtClean="0"/>
-              <a:t>14/12/2022</a:t>
+              <a:t>17/01/2023</a:t>
             </a:fld>
             <a:endParaRPr lang="en-GB" dirty="0"/>
           </a:p>
@@ -2510,7 +2510,7 @@
           <a:p>
             <a:fld id="{5913FB77-D8DB-4AB9-8EA5-EE8C3B57A5E1}" type="datetimeFigureOut">
               <a:rPr lang="en-GB" smtClean="0"/>
-              <a:t>14/12/2022</a:t>
+              <a:t>17/01/2023</a:t>
             </a:fld>
             <a:endParaRPr lang="en-GB" dirty="0"/>
           </a:p>
@@ -2623,7 +2623,7 @@
           <a:p>
             <a:fld id="{5913FB77-D8DB-4AB9-8EA5-EE8C3B57A5E1}" type="datetimeFigureOut">
               <a:rPr lang="en-GB" smtClean="0"/>
-              <a:t>14/12/2022</a:t>
+              <a:t>17/01/2023</a:t>
             </a:fld>
             <a:endParaRPr lang="en-GB" dirty="0"/>
           </a:p>
@@ -2936,7 +2936,7 @@
           <a:p>
             <a:fld id="{5913FB77-D8DB-4AB9-8EA5-EE8C3B57A5E1}" type="datetimeFigureOut">
               <a:rPr lang="en-GB" smtClean="0"/>
-              <a:t>14/12/2022</a:t>
+              <a:t>17/01/2023</a:t>
             </a:fld>
             <a:endParaRPr lang="en-GB" dirty="0"/>
           </a:p>
@@ -3225,7 +3225,7 @@
           <a:p>
             <a:fld id="{5913FB77-D8DB-4AB9-8EA5-EE8C3B57A5E1}" type="datetimeFigureOut">
               <a:rPr lang="en-GB" smtClean="0"/>
-              <a:t>14/12/2022</a:t>
+              <a:t>17/01/2023</a:t>
             </a:fld>
             <a:endParaRPr lang="en-GB" dirty="0"/>
           </a:p>
@@ -3468,7 +3468,7 @@
           <a:p>
             <a:fld id="{5913FB77-D8DB-4AB9-8EA5-EE8C3B57A5E1}" type="datetimeFigureOut">
               <a:rPr lang="en-GB" smtClean="0"/>
-              <a:t>14/12/2022</a:t>
+              <a:t>17/01/2023</a:t>
             </a:fld>
             <a:endParaRPr lang="en-GB" dirty="0"/>
           </a:p>
@@ -3931,7 +3931,7 @@
               <a:t> </a:t>
             </a:r>
             <a:r>
-              <a:rPr lang="pl-PL" sz="4400" dirty="0" err="1">
+              <a:rPr lang="pl-PL" sz="4400" dirty="0" smtClean="0">
                 <a:solidFill>
                   <a:srgbClr val="0070C0"/>
                 </a:solidFill>
@@ -4604,7 +4604,7 @@
           <a:graphicData uri="http://schemas.openxmlformats.org/presentationml/2006/ole">
             <mc:AlternateContent xmlns:mc="http://schemas.openxmlformats.org/markup-compatibility/2006">
               <mc:Choice xmlns:v="urn:schemas-microsoft-com:vml" Requires="v">
-                <p:oleObj spid="_x0000_s2050" name="Image" r:id="rId5" imgW="4926984" imgH="6171429" progId="Photoshop.Image.11">
+                <p:oleObj spid="_x0000_s2058" name="Image" r:id="rId5" imgW="4926984" imgH="6171429" progId="Photoshop.Image.11">
                   <p:embed/>
                 </p:oleObj>
               </mc:Choice>
@@ -4842,7 +4842,7 @@
           <a:graphicData uri="http://schemas.openxmlformats.org/presentationml/2006/ole">
             <mc:AlternateContent xmlns:mc="http://schemas.openxmlformats.org/markup-compatibility/2006">
               <mc:Choice xmlns:v="urn:schemas-microsoft-com:vml" Requires="v">
-                <p:oleObj spid="_x0000_s2051" name="Image" r:id="rId9" imgW="4926984" imgH="6171429" progId="Photoshop.Image.11">
+                <p:oleObj spid="_x0000_s2059" name="Image" r:id="rId9" imgW="4926984" imgH="6171429" progId="Photoshop.Image.11">
                   <p:embed/>
                 </p:oleObj>
               </mc:Choice>
@@ -5318,7 +5318,7 @@
           <a:graphicData uri="http://schemas.openxmlformats.org/presentationml/2006/ole">
             <mc:AlternateContent xmlns:mc="http://schemas.openxmlformats.org/markup-compatibility/2006">
               <mc:Choice xmlns:v="urn:schemas-microsoft-com:vml" Requires="v">
-                <p:oleObj spid="_x0000_s2052" name="Image" r:id="rId14" imgW="4926984" imgH="6171429" progId="Photoshop.Image.11">
+                <p:oleObj spid="_x0000_s2060" name="Image" r:id="rId14" imgW="4926984" imgH="6171429" progId="Photoshop.Image.11">
                   <p:embed/>
                 </p:oleObj>
               </mc:Choice>
@@ -5465,7 +5465,7 @@
           <a:graphicData uri="http://schemas.openxmlformats.org/presentationml/2006/ole">
             <mc:AlternateContent xmlns:mc="http://schemas.openxmlformats.org/markup-compatibility/2006">
               <mc:Choice xmlns:v="urn:schemas-microsoft-com:vml" Requires="v">
-                <p:oleObj spid="_x0000_s2053" name="Image" r:id="rId9" imgW="4926984" imgH="6171429" progId="Photoshop.Image.11">
+                <p:oleObj spid="_x0000_s2061" name="Image" r:id="rId9" imgW="4926984" imgH="6171429" progId="Photoshop.Image.11">
                   <p:embed/>
                 </p:oleObj>
               </mc:Choice>
@@ -7142,23 +7142,13 @@
               <a:t>We </a:t>
             </a:r>
             <a:r>
-              <a:rPr lang="pl-PL" sz="2800" dirty="0" err="1">
-                <a:solidFill>
-                  <a:srgbClr val="0070C0"/>
-                </a:solidFill>
-              </a:rPr>
-              <a:t>recommend</a:t>
-            </a:r>
-            <a:r>
-              <a:rPr lang="pl-PL" sz="2800" dirty="0">
-                <a:solidFill>
-                  <a:srgbClr val="0070C0"/>
-                </a:solidFill>
-              </a:rPr>
-              <a:t>:</a:t>
-            </a:r>
-          </a:p>
-          <a:p>
+              <a:rPr lang="pl-PL" sz="2800" dirty="0" smtClean="0">
+                <a:solidFill>
+                  <a:srgbClr val="0070C0"/>
+                </a:solidFill>
+              </a:rPr>
+              <a:t>recommend:</a:t>
+            </a:r>
             <a:endParaRPr lang="pl-PL" sz="2800" dirty="0">
               <a:solidFill>
                 <a:srgbClr val="0070C0"/>
@@ -7171,7 +7161,7 @@
               <a:buChar char="•"/>
             </a:pPr>
             <a:r>
-              <a:rPr lang="pl-PL" sz="2800" dirty="0" err="1">
+              <a:rPr lang="en-GB" sz="2800" dirty="0" smtClean="0">
                 <a:solidFill>
                   <a:srgbClr val="0070C0"/>
                 </a:solidFill>
@@ -7179,347 +7169,62 @@
               <a:t>Firstly</a:t>
             </a:r>
             <a:r>
-              <a:rPr lang="pl-PL" sz="2800" dirty="0">
-                <a:solidFill>
-                  <a:srgbClr val="0070C0"/>
-                </a:solidFill>
-              </a:rPr>
-              <a:t>, </a:t>
-            </a:r>
-            <a:r>
-              <a:rPr lang="pl-PL" sz="2800" dirty="0" err="1">
-                <a:solidFill>
-                  <a:srgbClr val="0070C0"/>
-                </a:solidFill>
-              </a:rPr>
-              <a:t>learn</a:t>
-            </a:r>
-            <a:r>
-              <a:rPr lang="pl-PL" sz="2800" dirty="0">
-                <a:solidFill>
-                  <a:srgbClr val="0070C0"/>
-                </a:solidFill>
-              </a:rPr>
-              <a:t> </a:t>
-            </a:r>
-            <a:r>
-              <a:rPr lang="pl-PL" sz="2800" dirty="0" err="1">
-                <a:solidFill>
-                  <a:srgbClr val="0070C0"/>
-                </a:solidFill>
-              </a:rPr>
-              <a:t>how</a:t>
-            </a:r>
-            <a:r>
-              <a:rPr lang="pl-PL" sz="2800" dirty="0">
-                <a:solidFill>
-                  <a:srgbClr val="0070C0"/>
-                </a:solidFill>
-              </a:rPr>
-              <a:t> to </a:t>
-            </a:r>
-            <a:r>
-              <a:rPr lang="pl-PL" sz="2800" dirty="0" err="1">
-                <a:solidFill>
-                  <a:srgbClr val="0070C0"/>
-                </a:solidFill>
-              </a:rPr>
-              <a:t>make</a:t>
-            </a:r>
-            <a:r>
-              <a:rPr lang="pl-PL" sz="2800" dirty="0">
-                <a:solidFill>
-                  <a:srgbClr val="0070C0"/>
-                </a:solidFill>
-              </a:rPr>
-              <a:t> </a:t>
-            </a:r>
-            <a:r>
-              <a:rPr lang="pl-PL" sz="2800" dirty="0" err="1">
-                <a:solidFill>
-                  <a:srgbClr val="0070C0"/>
-                </a:solidFill>
-              </a:rPr>
-              <a:t>simple</a:t>
-            </a:r>
-            <a:r>
-              <a:rPr lang="pl-PL" sz="2800" dirty="0">
-                <a:solidFill>
-                  <a:srgbClr val="0070C0"/>
-                </a:solidFill>
-              </a:rPr>
-              <a:t> </a:t>
-            </a:r>
-            <a:r>
-              <a:rPr lang="pl-PL" sz="2800" dirty="0" err="1">
-                <a:solidFill>
-                  <a:srgbClr val="0070C0"/>
-                </a:solidFill>
-              </a:rPr>
-              <a:t>plots</a:t>
-            </a:r>
-            <a:r>
-              <a:rPr lang="pl-PL" sz="2800" dirty="0">
-                <a:solidFill>
-                  <a:srgbClr val="0070C0"/>
-                </a:solidFill>
-              </a:rPr>
-              <a:t>, </a:t>
-            </a:r>
-            <a:r>
-              <a:rPr lang="pl-PL" sz="2800" dirty="0" err="1">
-                <a:solidFill>
-                  <a:srgbClr val="0070C0"/>
-                </a:solidFill>
-              </a:rPr>
-              <a:t>clean</a:t>
-            </a:r>
-            <a:r>
-              <a:rPr lang="pl-PL" sz="2800" dirty="0">
-                <a:solidFill>
-                  <a:srgbClr val="0070C0"/>
-                </a:solidFill>
-              </a:rPr>
-              <a:t>/</a:t>
-            </a:r>
-            <a:r>
-              <a:rPr lang="pl-PL" sz="2800" dirty="0" err="1">
-                <a:solidFill>
-                  <a:srgbClr val="0070C0"/>
-                </a:solidFill>
-              </a:rPr>
-              <a:t>reorganize</a:t>
-            </a:r>
-            <a:r>
-              <a:rPr lang="pl-PL" sz="2800" dirty="0">
-                <a:solidFill>
-                  <a:srgbClr val="0070C0"/>
-                </a:solidFill>
-              </a:rPr>
-              <a:t> </a:t>
-            </a:r>
-            <a:r>
-              <a:rPr lang="pl-PL" sz="2800" dirty="0" err="1">
-                <a:solidFill>
-                  <a:srgbClr val="0070C0"/>
-                </a:solidFill>
-              </a:rPr>
-              <a:t>files</a:t>
-            </a:r>
-            <a:r>
-              <a:rPr lang="pl-PL" sz="2800" dirty="0">
-                <a:solidFill>
-                  <a:srgbClr val="0070C0"/>
-                </a:solidFill>
-              </a:rPr>
-              <a:t> and data </a:t>
-            </a:r>
-            <a:r>
-              <a:rPr lang="pl-PL" sz="2800" dirty="0" err="1">
-                <a:solidFill>
-                  <a:srgbClr val="0070C0"/>
-                </a:solidFill>
-              </a:rPr>
-              <a:t>tables</a:t>
+              <a:rPr lang="en-GB" sz="2800" dirty="0">
+                <a:solidFill>
+                  <a:srgbClr val="0070C0"/>
+                </a:solidFill>
+              </a:rPr>
+              <a:t>, learn how to make simple plots, clean/reorganize files and data tables</a:t>
+            </a:r>
+          </a:p>
+          <a:p>
+            <a:pPr marL="457200" indent="-457200">
+              <a:buFont typeface="Arial" panose="020B0604020202020204" pitchFamily="34" charset="0"/>
+              <a:buChar char="•"/>
+            </a:pPr>
+            <a:r>
+              <a:rPr lang="en-GB" sz="2800" dirty="0" smtClean="0">
+                <a:solidFill>
+                  <a:srgbClr val="0070C0"/>
+                </a:solidFill>
+              </a:rPr>
+              <a:t>Secondly</a:t>
+            </a:r>
+            <a:r>
+              <a:rPr lang="en-GB" sz="2800" dirty="0">
+                <a:solidFill>
+                  <a:srgbClr val="0070C0"/>
+                </a:solidFill>
+              </a:rPr>
+              <a:t>, learn basics of software engineering and good programming practices</a:t>
+            </a:r>
+          </a:p>
+          <a:p>
+            <a:pPr marL="457200" indent="-457200">
+              <a:buFont typeface="Arial" panose="020B0604020202020204" pitchFamily="34" charset="0"/>
+              <a:buChar char="•"/>
+            </a:pPr>
+            <a:r>
+              <a:rPr lang="en-GB" sz="2800" dirty="0" smtClean="0">
+                <a:solidFill>
+                  <a:srgbClr val="0070C0"/>
+                </a:solidFill>
+              </a:rPr>
+              <a:t>Then </a:t>
+            </a:r>
+            <a:r>
+              <a:rPr lang="en-GB" sz="2800" dirty="0">
+                <a:solidFill>
+                  <a:srgbClr val="0070C0"/>
+                </a:solidFill>
+              </a:rPr>
+              <a:t>start coding advanced analysis and processing, construct pipelines with workflows</a:t>
             </a:r>
             <a:endParaRPr lang="pl-PL" sz="2800" dirty="0">
               <a:solidFill>
                 <a:srgbClr val="0070C0"/>
               </a:solidFill>
             </a:endParaRPr>
-          </a:p>
-          <a:p>
-            <a:pPr marL="457200" indent="-457200">
-              <a:buFont typeface="Arial" panose="020B0604020202020204" pitchFamily="34" charset="0"/>
-              <a:buChar char="•"/>
-            </a:pPr>
-            <a:r>
-              <a:rPr lang="pl-PL" sz="2800" dirty="0" err="1">
-                <a:solidFill>
-                  <a:srgbClr val="0070C0"/>
-                </a:solidFill>
-              </a:rPr>
-              <a:t>Secondly</a:t>
-            </a:r>
-            <a:r>
-              <a:rPr lang="pl-PL" sz="2800" dirty="0">
-                <a:solidFill>
-                  <a:srgbClr val="0070C0"/>
-                </a:solidFill>
-              </a:rPr>
-              <a:t>, </a:t>
-            </a:r>
-            <a:r>
-              <a:rPr lang="pl-PL" sz="2800" dirty="0" err="1">
-                <a:solidFill>
-                  <a:srgbClr val="0070C0"/>
-                </a:solidFill>
-              </a:rPr>
-              <a:t>learn</a:t>
-            </a:r>
-            <a:r>
-              <a:rPr lang="pl-PL" sz="2800" dirty="0">
-                <a:solidFill>
-                  <a:srgbClr val="0070C0"/>
-                </a:solidFill>
-              </a:rPr>
-              <a:t> </a:t>
-            </a:r>
-            <a:r>
-              <a:rPr lang="pl-PL" sz="2800" dirty="0" err="1">
-                <a:solidFill>
-                  <a:srgbClr val="0070C0"/>
-                </a:solidFill>
-              </a:rPr>
-              <a:t>basics</a:t>
-            </a:r>
-            <a:r>
-              <a:rPr lang="pl-PL" sz="2800" dirty="0">
-                <a:solidFill>
-                  <a:srgbClr val="0070C0"/>
-                </a:solidFill>
-              </a:rPr>
-              <a:t> of software engineering and </a:t>
-            </a:r>
-            <a:r>
-              <a:rPr lang="pl-PL" sz="2800" dirty="0" err="1">
-                <a:solidFill>
-                  <a:srgbClr val="0070C0"/>
-                </a:solidFill>
-              </a:rPr>
-              <a:t>good</a:t>
-            </a:r>
-            <a:r>
-              <a:rPr lang="pl-PL" sz="2800" dirty="0">
-                <a:solidFill>
-                  <a:srgbClr val="0070C0"/>
-                </a:solidFill>
-              </a:rPr>
-              <a:t> </a:t>
-            </a:r>
-            <a:r>
-              <a:rPr lang="pl-PL" sz="2800" dirty="0" err="1">
-                <a:solidFill>
-                  <a:srgbClr val="0070C0"/>
-                </a:solidFill>
-              </a:rPr>
-              <a:t>programming</a:t>
-            </a:r>
-            <a:r>
-              <a:rPr lang="pl-PL" sz="2800" dirty="0">
-                <a:solidFill>
-                  <a:srgbClr val="0070C0"/>
-                </a:solidFill>
-              </a:rPr>
-              <a:t> </a:t>
-            </a:r>
-            <a:r>
-              <a:rPr lang="pl-PL" sz="2800" dirty="0" err="1">
-                <a:solidFill>
-                  <a:srgbClr val="0070C0"/>
-                </a:solidFill>
-              </a:rPr>
-              <a:t>practices</a:t>
-            </a:r>
-            <a:endParaRPr lang="pl-PL" sz="2800" dirty="0">
-              <a:solidFill>
-                <a:srgbClr val="0070C0"/>
-              </a:solidFill>
-            </a:endParaRPr>
-          </a:p>
-          <a:p>
-            <a:pPr marL="457200" indent="-457200">
-              <a:buFont typeface="Arial" panose="020B0604020202020204" pitchFamily="34" charset="0"/>
-              <a:buChar char="•"/>
-            </a:pPr>
-            <a:r>
-              <a:rPr lang="pl-PL" sz="2800" dirty="0">
-                <a:solidFill>
-                  <a:srgbClr val="0070C0"/>
-                </a:solidFill>
-              </a:rPr>
-              <a:t>Then start </a:t>
-            </a:r>
-            <a:r>
-              <a:rPr lang="pl-PL" sz="2800" dirty="0" err="1">
-                <a:solidFill>
-                  <a:srgbClr val="0070C0"/>
-                </a:solidFill>
-              </a:rPr>
-              <a:t>coding</a:t>
-            </a:r>
-            <a:r>
-              <a:rPr lang="pl-PL" sz="2800" dirty="0">
-                <a:solidFill>
-                  <a:srgbClr val="0070C0"/>
-                </a:solidFill>
-              </a:rPr>
-              <a:t> </a:t>
-            </a:r>
-            <a:r>
-              <a:rPr lang="pl-PL" sz="2800" dirty="0" err="1">
-                <a:solidFill>
-                  <a:srgbClr val="0070C0"/>
-                </a:solidFill>
-              </a:rPr>
-              <a:t>advanced</a:t>
-            </a:r>
-            <a:r>
-              <a:rPr lang="pl-PL" sz="2800" dirty="0">
-                <a:solidFill>
-                  <a:srgbClr val="0070C0"/>
-                </a:solidFill>
-              </a:rPr>
-              <a:t> </a:t>
-            </a:r>
-            <a:r>
-              <a:rPr lang="pl-PL" sz="2800" dirty="0" err="1">
-                <a:solidFill>
-                  <a:srgbClr val="0070C0"/>
-                </a:solidFill>
-              </a:rPr>
-              <a:t>analysis</a:t>
-            </a:r>
-            <a:r>
-              <a:rPr lang="pl-PL" sz="2800" dirty="0">
-                <a:solidFill>
-                  <a:srgbClr val="0070C0"/>
-                </a:solidFill>
-              </a:rPr>
-              <a:t>, </a:t>
-            </a:r>
-            <a:r>
-              <a:rPr lang="pl-PL" sz="2800" dirty="0" err="1">
-                <a:solidFill>
-                  <a:srgbClr val="0070C0"/>
-                </a:solidFill>
-              </a:rPr>
-              <a:t>processing</a:t>
-            </a:r>
-            <a:r>
-              <a:rPr lang="pl-PL" sz="2800" dirty="0">
-                <a:solidFill>
-                  <a:srgbClr val="0070C0"/>
-                </a:solidFill>
-              </a:rPr>
-              <a:t>, </a:t>
-            </a:r>
-            <a:r>
-              <a:rPr lang="pl-PL" sz="2800" dirty="0" err="1">
-                <a:solidFill>
-                  <a:srgbClr val="0070C0"/>
-                </a:solidFill>
-              </a:rPr>
-              <a:t>pipelines</a:t>
-            </a:r>
-            <a:r>
-              <a:rPr lang="pl-PL" sz="2800" dirty="0">
-                <a:solidFill>
-                  <a:srgbClr val="0070C0"/>
-                </a:solidFill>
-              </a:rPr>
-              <a:t>…</a:t>
-            </a:r>
           </a:p>
         </p:txBody>
       </p:sp>
@@ -9585,7 +9290,7 @@
           <a:graphicData uri="http://schemas.openxmlformats.org/presentationml/2006/ole">
             <mc:AlternateContent xmlns:mc="http://schemas.openxmlformats.org/markup-compatibility/2006">
               <mc:Choice xmlns:v="urn:schemas-microsoft-com:vml" Requires="v">
-                <p:oleObj spid="_x0000_s1026" name="Image" r:id="rId4" imgW="4926984" imgH="6171429" progId="Photoshop.Image.11">
+                <p:oleObj spid="_x0000_s1030" name="Image" r:id="rId4" imgW="4926984" imgH="6171429" progId="Photoshop.Image.11">
                   <p:embed/>
                 </p:oleObj>
               </mc:Choice>
@@ -9859,7 +9564,7 @@
           <a:graphicData uri="http://schemas.openxmlformats.org/presentationml/2006/ole">
             <mc:AlternateContent xmlns:mc="http://schemas.openxmlformats.org/markup-compatibility/2006">
               <mc:Choice xmlns:v="urn:schemas-microsoft-com:vml" Requires="v">
-                <p:oleObj spid="_x0000_s1027" name="Image" r:id="rId9" imgW="4926984" imgH="6171429" progId="Photoshop.Image.11">
+                <p:oleObj spid="_x0000_s1031" name="Image" r:id="rId9" imgW="4926984" imgH="6171429" progId="Photoshop.Image.11">
                   <p:embed/>
                 </p:oleObj>
               </mc:Choice>
@@ -10920,84 +10625,28 @@
               <a:t>(</a:t>
             </a:r>
             <a:r>
-              <a:rPr lang="pl-PL" sz="2800" dirty="0" err="1">
-                <a:solidFill>
-                  <a:srgbClr val="0070C0"/>
-                </a:solidFill>
-              </a:rPr>
-              <a:t>retries</a:t>
-            </a:r>
-            <a:r>
-              <a:rPr lang="pl-PL" sz="2800" dirty="0">
-                <a:solidFill>
-                  <a:srgbClr val="0070C0"/>
-                </a:solidFill>
-              </a:rPr>
-              <a:t>, </a:t>
-            </a:r>
-            <a:r>
-              <a:rPr lang="pl-PL" sz="2800" dirty="0" err="1">
-                <a:solidFill>
-                  <a:srgbClr val="0070C0"/>
-                </a:solidFill>
-              </a:rPr>
-              <a:t>adjustments</a:t>
-            </a:r>
-            <a:r>
-              <a:rPr lang="pl-PL" sz="2800" dirty="0">
-                <a:solidFill>
-                  <a:srgbClr val="0070C0"/>
-                </a:solidFill>
-              </a:rPr>
-              <a:t>, </a:t>
-            </a:r>
-            <a:r>
-              <a:rPr lang="pl-PL" sz="2800" dirty="0" err="1">
-                <a:solidFill>
-                  <a:srgbClr val="0070C0"/>
-                </a:solidFill>
-              </a:rPr>
-              <a:t>modifications</a:t>
-            </a:r>
-            <a:r>
-              <a:rPr lang="pl-PL" sz="2800" dirty="0">
-                <a:solidFill>
-                  <a:srgbClr val="0070C0"/>
-                </a:solidFill>
-              </a:rPr>
-              <a:t> to </a:t>
-            </a:r>
-            <a:r>
-              <a:rPr lang="pl-PL" sz="2800" dirty="0" err="1">
-                <a:solidFill>
-                  <a:srgbClr val="0070C0"/>
-                </a:solidFill>
-              </a:rPr>
-              <a:t>exp</a:t>
-            </a:r>
-            <a:r>
-              <a:rPr lang="pl-PL" sz="2800" dirty="0">
-                <a:solidFill>
-                  <a:srgbClr val="0070C0"/>
-                </a:solidFill>
-              </a:rPr>
-              <a:t> </a:t>
-            </a:r>
-            <a:r>
-              <a:rPr lang="pl-PL" sz="2800" dirty="0" err="1">
-                <a:solidFill>
-                  <a:srgbClr val="0070C0"/>
-                </a:solidFill>
-              </a:rPr>
-              <a:t>procedures</a:t>
-            </a:r>
-            <a:r>
-              <a:rPr lang="pl-PL" sz="2800" dirty="0">
-                <a:solidFill>
-                  <a:srgbClr val="0070C0"/>
-                </a:solidFill>
-              </a:rPr>
-              <a:t>)</a:t>
+              <a:rPr lang="pl-PL" sz="2800" dirty="0" smtClean="0">
+                <a:solidFill>
+                  <a:srgbClr val="0070C0"/>
+                </a:solidFill>
+              </a:rPr>
+              <a:t>retries, adjustments, modifications </a:t>
+            </a:r>
+            <a:r>
+              <a:rPr lang="pl-PL" sz="2800" dirty="0">
+                <a:solidFill>
+                  <a:srgbClr val="0070C0"/>
+                </a:solidFill>
+              </a:rPr>
+              <a:t>to exp </a:t>
+            </a:r>
+            <a:r>
+              <a:rPr lang="pl-PL" sz="2800" dirty="0" smtClean="0">
+                <a:solidFill>
+                  <a:srgbClr val="0070C0"/>
+                </a:solidFill>
+              </a:rPr>
+              <a:t>procedures)</a:t>
             </a:r>
             <a:endParaRPr lang="en-GB" sz="2800" dirty="0">
               <a:solidFill>
@@ -11019,12 +10668,12 @@
               <a:t>data </a:t>
             </a:r>
             <a:r>
-              <a:rPr lang="pl-PL" sz="2800" dirty="0" err="1">
-                <a:solidFill>
-                  <a:srgbClr val="0070C0"/>
-                </a:solidFill>
-              </a:rPr>
-              <a:t>exploration</a:t>
+              <a:rPr lang="pl-PL" sz="2800" dirty="0" smtClean="0">
+                <a:solidFill>
+                  <a:srgbClr val="0070C0"/>
+                </a:solidFill>
+              </a:rPr>
+              <a:t>exploration </a:t>
             </a:r>
             <a:endParaRPr lang="en-GB" sz="2800" dirty="0">
               <a:solidFill>
@@ -11038,55 +10687,15 @@
               <a:buChar char="•"/>
             </a:pPr>
             <a:r>
-              <a:rPr lang="pl-PL" sz="2800" dirty="0" err="1">
-                <a:solidFill>
-                  <a:srgbClr val="0070C0"/>
-                </a:solidFill>
-              </a:rPr>
-              <a:t>selection</a:t>
-            </a:r>
-            <a:r>
-              <a:rPr lang="pl-PL" sz="2800" dirty="0">
-                <a:solidFill>
-                  <a:srgbClr val="0070C0"/>
-                </a:solidFill>
-              </a:rPr>
-              <a:t> of </a:t>
-            </a:r>
-            <a:r>
-              <a:rPr lang="pl-PL" sz="2800" dirty="0" err="1">
-                <a:solidFill>
-                  <a:srgbClr val="0070C0"/>
-                </a:solidFill>
-              </a:rPr>
-              <a:t>analysis</a:t>
-            </a:r>
-            <a:r>
-              <a:rPr lang="pl-PL" sz="2800" dirty="0">
-                <a:solidFill>
-                  <a:srgbClr val="0070C0"/>
-                </a:solidFill>
-              </a:rPr>
-              <a:t> </a:t>
-            </a:r>
-            <a:r>
-              <a:rPr lang="pl-PL" sz="2800" dirty="0" err="1">
-                <a:solidFill>
-                  <a:srgbClr val="0070C0"/>
-                </a:solidFill>
-              </a:rPr>
-              <a:t>methods</a:t>
-            </a:r>
-            <a:r>
-              <a:rPr lang="pl-PL" sz="2800" dirty="0">
-                <a:solidFill>
-                  <a:srgbClr val="0070C0"/>
-                </a:solidFill>
-              </a:rPr>
-              <a:t> and </a:t>
-            </a:r>
-            <a:r>
-              <a:rPr lang="pl-PL" sz="2800" dirty="0" err="1">
+              <a:rPr lang="pl-PL" sz="2800" dirty="0">
+                <a:solidFill>
+                  <a:srgbClr val="0070C0"/>
+                </a:solidFill>
+              </a:rPr>
+              <a:t>selection of analysis methods and </a:t>
+            </a:r>
+            <a:r>
+              <a:rPr lang="pl-PL" sz="2800" dirty="0" smtClean="0">
                 <a:solidFill>
                   <a:srgbClr val="0070C0"/>
                 </a:solidFill>
@@ -11113,44 +10722,28 @@
               <a:t>(</a:t>
             </a:r>
             <a:r>
-              <a:rPr lang="pl-PL" sz="2800" dirty="0" err="1">
-                <a:solidFill>
-                  <a:srgbClr val="0070C0"/>
-                </a:solidFill>
-              </a:rPr>
-              <a:t>statistical</a:t>
-            </a:r>
-            <a:r>
-              <a:rPr lang="pl-PL" sz="2800" dirty="0">
-                <a:solidFill>
-                  <a:srgbClr val="0070C0"/>
-                </a:solidFill>
-              </a:rPr>
-              <a:t>) </a:t>
-            </a:r>
-            <a:r>
-              <a:rPr lang="pl-PL" sz="2800" dirty="0" err="1">
-                <a:solidFill>
-                  <a:srgbClr val="0070C0"/>
-                </a:solidFill>
-              </a:rPr>
-              <a:t>validation</a:t>
-            </a:r>
-            <a:r>
-              <a:rPr lang="pl-PL" sz="2800" dirty="0">
-                <a:solidFill>
-                  <a:srgbClr val="0070C0"/>
-                </a:solidFill>
-              </a:rPr>
-              <a:t> of </a:t>
-            </a:r>
-            <a:r>
-              <a:rPr lang="pl-PL" sz="2800" dirty="0" err="1">
-                <a:solidFill>
-                  <a:srgbClr val="0070C0"/>
-                </a:solidFill>
-              </a:rPr>
-              <a:t>results</a:t>
+              <a:rPr lang="pl-PL" sz="2800" dirty="0" smtClean="0">
+                <a:solidFill>
+                  <a:srgbClr val="0070C0"/>
+                </a:solidFill>
+              </a:rPr>
+              <a:t>statistical) validation </a:t>
+            </a:r>
+            <a:r>
+              <a:rPr lang="pl-PL" sz="2800" dirty="0">
+                <a:solidFill>
+                  <a:srgbClr val="0070C0"/>
+                </a:solidFill>
+              </a:rPr>
+              <a:t>of </a:t>
+            </a:r>
+            <a:r>
+              <a:rPr lang="pl-PL" sz="2800" dirty="0" smtClean="0">
+                <a:solidFill>
+                  <a:srgbClr val="0070C0"/>
+                </a:solidFill>
+              </a:rPr>
+              <a:t>results </a:t>
             </a:r>
             <a:endParaRPr lang="en-GB" sz="2800" dirty="0">
               <a:solidFill>
@@ -11164,52 +10757,20 @@
               <a:buChar char="•"/>
             </a:pPr>
             <a:r>
-              <a:rPr lang="pl-PL" sz="2800" dirty="0" err="1">
-                <a:solidFill>
-                  <a:srgbClr val="0070C0"/>
-                </a:solidFill>
-              </a:rPr>
-              <a:t>final</a:t>
-            </a:r>
-            <a:r>
-              <a:rPr lang="pl-PL" sz="2800" dirty="0">
-                <a:solidFill>
-                  <a:srgbClr val="0070C0"/>
-                </a:solidFill>
-              </a:rPr>
-              <a:t> version of </a:t>
-            </a:r>
-            <a:r>
-              <a:rPr lang="pl-PL" sz="2800" dirty="0" err="1">
-                <a:solidFill>
-                  <a:srgbClr val="0070C0"/>
-                </a:solidFill>
-              </a:rPr>
-              <a:t>results</a:t>
-            </a:r>
-            <a:r>
-              <a:rPr lang="pl-PL" sz="2800" dirty="0">
-                <a:solidFill>
-                  <a:srgbClr val="0070C0"/>
-                </a:solidFill>
-              </a:rPr>
-              <a:t> and </a:t>
-            </a:r>
-            <a:r>
-              <a:rPr lang="pl-PL" sz="2800" dirty="0" err="1">
-                <a:solidFill>
-                  <a:srgbClr val="0070C0"/>
-                </a:solidFill>
-              </a:rPr>
-              <a:t>graphical</a:t>
-            </a:r>
-            <a:r>
-              <a:rPr lang="pl-PL" sz="2800" dirty="0">
-                <a:solidFill>
-                  <a:srgbClr val="0070C0"/>
-                </a:solidFill>
-              </a:rPr>
-              <a:t> rendering</a:t>
+              <a:rPr lang="pl-PL" sz="2800" dirty="0" smtClean="0">
+                <a:solidFill>
+                  <a:srgbClr val="0070C0"/>
+                </a:solidFill>
+              </a:rPr>
+              <a:t>final  </a:t>
+            </a:r>
+            <a:r>
+              <a:rPr lang="pl-PL" sz="2800" dirty="0">
+                <a:solidFill>
+                  <a:srgbClr val="0070C0"/>
+                </a:solidFill>
+              </a:rPr>
+              <a:t>version of results and graphical rendering</a:t>
             </a:r>
             <a:endParaRPr lang="en-GB" sz="2800" dirty="0">
               <a:solidFill>
@@ -11380,23 +10941,23 @@
           <a:lstStyle/>
           <a:p>
             <a:r>
-              <a:rPr lang="pl-PL" sz="2800" dirty="0" err="1">
-                <a:solidFill>
-                  <a:srgbClr val="0070C0"/>
-                </a:solidFill>
-              </a:rPr>
-              <a:t>Jupyter</a:t>
-            </a:r>
-            <a:r>
-              <a:rPr lang="pl-PL" sz="2800" dirty="0">
-                <a:solidFill>
-                  <a:srgbClr val="0070C0"/>
-                </a:solidFill>
-              </a:rPr>
-              <a:t> notebook </a:t>
-            </a:r>
-            <a:r>
-              <a:rPr lang="pl-PL" sz="2800" dirty="0" err="1">
+              <a:rPr lang="pl-PL" sz="2800" dirty="0" smtClean="0">
+                <a:solidFill>
+                  <a:srgbClr val="0070C0"/>
+                </a:solidFill>
+              </a:rPr>
+              <a:t>Jupyter </a:t>
+            </a:r>
+            <a:r>
+              <a:rPr lang="pl-PL" sz="2800" dirty="0">
+                <a:solidFill>
+                  <a:srgbClr val="0070C0"/>
+                </a:solidFill>
+              </a:rPr>
+              <a:t>notebook </a:t>
+            </a:r>
+            <a:r>
+              <a:rPr lang="pl-PL" sz="2800" dirty="0" smtClean="0">
                 <a:solidFill>
                   <a:srgbClr val="0070C0"/>
                 </a:solidFill>
@@ -12025,68 +11586,20 @@
               <a:buChar char="•"/>
             </a:pPr>
             <a:r>
-              <a:rPr lang="pl-PL" sz="2800" dirty="0" err="1">
-                <a:solidFill>
-                  <a:srgbClr val="0070C0"/>
-                </a:solidFill>
-              </a:rPr>
-              <a:t>Interminent</a:t>
-            </a:r>
-            <a:r>
-              <a:rPr lang="pl-PL" sz="2800" dirty="0">
-                <a:solidFill>
-                  <a:srgbClr val="0070C0"/>
-                </a:solidFill>
-              </a:rPr>
-              <a:t> </a:t>
-            </a:r>
-            <a:r>
-              <a:rPr lang="pl-PL" sz="2800" dirty="0" err="1">
-                <a:solidFill>
-                  <a:srgbClr val="0070C0"/>
-                </a:solidFill>
-              </a:rPr>
-              <a:t>reusults</a:t>
-            </a:r>
-            <a:r>
-              <a:rPr lang="pl-PL" sz="2800" dirty="0">
-                <a:solidFill>
-                  <a:srgbClr val="0070C0"/>
-                </a:solidFill>
-              </a:rPr>
-              <a:t>, </a:t>
-            </a:r>
-            <a:r>
-              <a:rPr lang="pl-PL" sz="2800" dirty="0" err="1">
-                <a:solidFill>
-                  <a:srgbClr val="0070C0"/>
-                </a:solidFill>
-              </a:rPr>
-              <a:t>adjustments</a:t>
-            </a:r>
-            <a:r>
-              <a:rPr lang="pl-PL" sz="2800" dirty="0">
-                <a:solidFill>
-                  <a:srgbClr val="0070C0"/>
-                </a:solidFill>
-              </a:rPr>
-              <a:t>, </a:t>
-            </a:r>
-            <a:r>
-              <a:rPr lang="pl-PL" sz="2800" dirty="0" err="1">
-                <a:solidFill>
-                  <a:srgbClr val="0070C0"/>
-                </a:solidFill>
-              </a:rPr>
-              <a:t>steps</a:t>
-            </a:r>
-            <a:r>
-              <a:rPr lang="pl-PL" sz="2800" dirty="0">
-                <a:solidFill>
-                  <a:srgbClr val="0070C0"/>
-                </a:solidFill>
-              </a:rPr>
-              <a:t>….</a:t>
+              <a:rPr lang="pl-PL" sz="2800" dirty="0" smtClean="0">
+                <a:solidFill>
+                  <a:srgbClr val="0070C0"/>
+                </a:solidFill>
+              </a:rPr>
+              <a:t>Intermediate </a:t>
+            </a:r>
+            <a:r>
+              <a:rPr lang="pl-PL" sz="2800" dirty="0">
+                <a:solidFill>
+                  <a:srgbClr val="0070C0"/>
+                </a:solidFill>
+              </a:rPr>
+              <a:t>reusults, adjustments, steps….</a:t>
             </a:r>
           </a:p>
           <a:p>
@@ -12216,39 +11729,15 @@
           <a:lstStyle/>
           <a:p>
             <a:r>
-              <a:rPr lang="pl-PL" dirty="0" err="1">
-                <a:solidFill>
-                  <a:srgbClr val="0070C0"/>
-                </a:solidFill>
-              </a:rPr>
-              <a:t>Reusable</a:t>
-            </a:r>
-            <a:r>
               <a:rPr lang="pl-PL" dirty="0">
                 <a:solidFill>
                   <a:srgbClr val="0070C0"/>
                 </a:solidFill>
               </a:rPr>
-              <a:t> ad-hoc </a:t>
-            </a:r>
-            <a:r>
-              <a:rPr lang="pl-PL" dirty="0" err="1">
-                <a:solidFill>
-                  <a:srgbClr val="0070C0"/>
-                </a:solidFill>
-              </a:rPr>
-              <a:t>analysis</a:t>
-            </a:r>
-            <a:r>
-              <a:rPr lang="pl-PL" dirty="0">
-                <a:solidFill>
-                  <a:srgbClr val="0070C0"/>
-                </a:solidFill>
-              </a:rPr>
-              <a:t> with </a:t>
-            </a:r>
-            <a:r>
-              <a:rPr lang="pl-PL" dirty="0" err="1">
+              <a:t>Reusable ad-hoc analysis with </a:t>
+            </a:r>
+            <a:r>
+              <a:rPr lang="pl-PL" dirty="0" smtClean="0">
                 <a:solidFill>
                   <a:srgbClr val="0070C0"/>
                 </a:solidFill>
@@ -13238,103 +12727,7 @@
                   <a:srgbClr val="0070C0"/>
                 </a:solidFill>
               </a:rPr>
-              <a:t>Notebook </a:t>
-            </a:r>
-            <a:r>
-              <a:rPr lang="pl-PL" sz="2800" dirty="0" err="1">
-                <a:solidFill>
-                  <a:srgbClr val="0070C0"/>
-                </a:solidFill>
-              </a:rPr>
-              <a:t>has</a:t>
-            </a:r>
-            <a:r>
-              <a:rPr lang="pl-PL" sz="2800" dirty="0">
-                <a:solidFill>
-                  <a:srgbClr val="0070C0"/>
-                </a:solidFill>
-              </a:rPr>
-              <a:t> to be </a:t>
-            </a:r>
-            <a:r>
-              <a:rPr lang="pl-PL" sz="2800" dirty="0" err="1">
-                <a:solidFill>
-                  <a:srgbClr val="0070C0"/>
-                </a:solidFill>
-              </a:rPr>
-              <a:t>shipped</a:t>
-            </a:r>
-            <a:r>
-              <a:rPr lang="pl-PL" sz="2800" dirty="0">
-                <a:solidFill>
-                  <a:srgbClr val="0070C0"/>
-                </a:solidFill>
-              </a:rPr>
-              <a:t> with </a:t>
-            </a:r>
-            <a:r>
-              <a:rPr lang="pl-PL" sz="2800" dirty="0" err="1">
-                <a:solidFill>
-                  <a:srgbClr val="0070C0"/>
-                </a:solidFill>
-              </a:rPr>
-              <a:t>all</a:t>
-            </a:r>
-            <a:r>
-              <a:rPr lang="pl-PL" sz="2800" dirty="0">
-                <a:solidFill>
-                  <a:srgbClr val="0070C0"/>
-                </a:solidFill>
-              </a:rPr>
-              <a:t> file </a:t>
-            </a:r>
-            <a:r>
-              <a:rPr lang="pl-PL" sz="2800" dirty="0" err="1">
-                <a:solidFill>
-                  <a:srgbClr val="0070C0"/>
-                </a:solidFill>
-              </a:rPr>
-              <a:t>inputs</a:t>
-            </a:r>
-            <a:r>
-              <a:rPr lang="pl-PL" sz="2800" dirty="0">
-                <a:solidFill>
-                  <a:srgbClr val="0070C0"/>
-                </a:solidFill>
-              </a:rPr>
-              <a:t> and </a:t>
-            </a:r>
-            <a:r>
-              <a:rPr lang="pl-PL" sz="2800" dirty="0" err="1">
-                <a:solidFill>
-                  <a:srgbClr val="0070C0"/>
-                </a:solidFill>
-              </a:rPr>
-              <a:t>description</a:t>
-            </a:r>
-            <a:r>
-              <a:rPr lang="pl-PL" sz="2800" dirty="0">
-                <a:solidFill>
-                  <a:srgbClr val="0070C0"/>
-                </a:solidFill>
-              </a:rPr>
-              <a:t> of </a:t>
-            </a:r>
-            <a:r>
-              <a:rPr lang="pl-PL" sz="2800" dirty="0" err="1">
-                <a:solidFill>
-                  <a:srgbClr val="0070C0"/>
-                </a:solidFill>
-              </a:rPr>
-              <a:t>runtime</a:t>
-            </a:r>
-            <a:r>
-              <a:rPr lang="pl-PL" sz="2800" dirty="0">
-                <a:solidFill>
-                  <a:srgbClr val="0070C0"/>
-                </a:solidFill>
-              </a:rPr>
-              <a:t> environment</a:t>
+              <a:t>Notebook has to be shipped with all file inputs and description of runtime environment</a:t>
             </a:r>
             <a:endParaRPr lang="en-GB" sz="2800" dirty="0">
               <a:solidFill>

</xml_diff>

<commit_message>
better objectives and closing
</commit_message>
<xml_diff>
--- a/instructors/10-Reusable-analysis.pptx
+++ b/instructors/10-Reusable-analysis.pptx
@@ -5,7 +5,7 @@
     <p:sldMasterId id="2147483648" r:id="rId1"/>
   </p:sldMasterIdLst>
   <p:notesMasterIdLst>
-    <p:notesMasterId r:id="rId21"/>
+    <p:notesMasterId r:id="rId22"/>
   </p:notesMasterIdLst>
   <p:sldIdLst>
     <p:sldId id="276" r:id="rId2"/>
@@ -27,6 +27,7 @@
     <p:sldId id="291" r:id="rId18"/>
     <p:sldId id="292" r:id="rId19"/>
     <p:sldId id="293" r:id="rId20"/>
+    <p:sldId id="294" r:id="rId21"/>
   </p:sldIdLst>
   <p:sldSz cx="12192000" cy="6858000"/>
   <p:notesSz cx="6858000" cy="9144000"/>
@@ -215,7 +216,7 @@
           <a:p>
             <a:fld id="{585C48AE-4A1E-9A43-835F-510354165F99}" type="datetimeFigureOut">
               <a:rPr lang="en-GB" smtClean="0"/>
-              <a:t>17/01/2023</a:t>
+              <a:t>18/01/2023</a:t>
             </a:fld>
             <a:endParaRPr lang="en-GB" dirty="0"/>
           </a:p>
@@ -799,7 +800,7 @@
           <a:p>
             <a:fld id="{5913FB77-D8DB-4AB9-8EA5-EE8C3B57A5E1}" type="datetimeFigureOut">
               <a:rPr lang="en-GB" smtClean="0"/>
-              <a:t>17/01/2023</a:t>
+              <a:t>18/01/2023</a:t>
             </a:fld>
             <a:endParaRPr lang="en-GB" dirty="0"/>
           </a:p>
@@ -999,7 +1000,7 @@
           <a:p>
             <a:fld id="{5913FB77-D8DB-4AB9-8EA5-EE8C3B57A5E1}" type="datetimeFigureOut">
               <a:rPr lang="en-GB" smtClean="0"/>
-              <a:t>17/01/2023</a:t>
+              <a:t>18/01/2023</a:t>
             </a:fld>
             <a:endParaRPr lang="en-GB" dirty="0"/>
           </a:p>
@@ -1209,7 +1210,7 @@
           <a:p>
             <a:fld id="{5913FB77-D8DB-4AB9-8EA5-EE8C3B57A5E1}" type="datetimeFigureOut">
               <a:rPr lang="en-GB" smtClean="0"/>
-              <a:t>17/01/2023</a:t>
+              <a:t>18/01/2023</a:t>
             </a:fld>
             <a:endParaRPr lang="en-GB" dirty="0"/>
           </a:p>
@@ -1409,7 +1410,7 @@
           <a:p>
             <a:fld id="{5913FB77-D8DB-4AB9-8EA5-EE8C3B57A5E1}" type="datetimeFigureOut">
               <a:rPr lang="en-GB" smtClean="0"/>
-              <a:t>17/01/2023</a:t>
+              <a:t>18/01/2023</a:t>
             </a:fld>
             <a:endParaRPr lang="en-GB" dirty="0"/>
           </a:p>
@@ -1685,7 +1686,7 @@
           <a:p>
             <a:fld id="{5913FB77-D8DB-4AB9-8EA5-EE8C3B57A5E1}" type="datetimeFigureOut">
               <a:rPr lang="en-GB" smtClean="0"/>
-              <a:t>17/01/2023</a:t>
+              <a:t>18/01/2023</a:t>
             </a:fld>
             <a:endParaRPr lang="en-GB" dirty="0"/>
           </a:p>
@@ -1953,7 +1954,7 @@
           <a:p>
             <a:fld id="{5913FB77-D8DB-4AB9-8EA5-EE8C3B57A5E1}" type="datetimeFigureOut">
               <a:rPr lang="en-GB" smtClean="0"/>
-              <a:t>17/01/2023</a:t>
+              <a:t>18/01/2023</a:t>
             </a:fld>
             <a:endParaRPr lang="en-GB" dirty="0"/>
           </a:p>
@@ -2368,7 +2369,7 @@
           <a:p>
             <a:fld id="{5913FB77-D8DB-4AB9-8EA5-EE8C3B57A5E1}" type="datetimeFigureOut">
               <a:rPr lang="en-GB" smtClean="0"/>
-              <a:t>17/01/2023</a:t>
+              <a:t>18/01/2023</a:t>
             </a:fld>
             <a:endParaRPr lang="en-GB" dirty="0"/>
           </a:p>
@@ -2510,7 +2511,7 @@
           <a:p>
             <a:fld id="{5913FB77-D8DB-4AB9-8EA5-EE8C3B57A5E1}" type="datetimeFigureOut">
               <a:rPr lang="en-GB" smtClean="0"/>
-              <a:t>17/01/2023</a:t>
+              <a:t>18/01/2023</a:t>
             </a:fld>
             <a:endParaRPr lang="en-GB" dirty="0"/>
           </a:p>
@@ -2623,7 +2624,7 @@
           <a:p>
             <a:fld id="{5913FB77-D8DB-4AB9-8EA5-EE8C3B57A5E1}" type="datetimeFigureOut">
               <a:rPr lang="en-GB" smtClean="0"/>
-              <a:t>17/01/2023</a:t>
+              <a:t>18/01/2023</a:t>
             </a:fld>
             <a:endParaRPr lang="en-GB" dirty="0"/>
           </a:p>
@@ -2936,7 +2937,7 @@
           <a:p>
             <a:fld id="{5913FB77-D8DB-4AB9-8EA5-EE8C3B57A5E1}" type="datetimeFigureOut">
               <a:rPr lang="en-GB" smtClean="0"/>
-              <a:t>17/01/2023</a:t>
+              <a:t>18/01/2023</a:t>
             </a:fld>
             <a:endParaRPr lang="en-GB" dirty="0"/>
           </a:p>
@@ -3225,7 +3226,7 @@
           <a:p>
             <a:fld id="{5913FB77-D8DB-4AB9-8EA5-EE8C3B57A5E1}" type="datetimeFigureOut">
               <a:rPr lang="en-GB" smtClean="0"/>
-              <a:t>17/01/2023</a:t>
+              <a:t>18/01/2023</a:t>
             </a:fld>
             <a:endParaRPr lang="en-GB" dirty="0"/>
           </a:p>
@@ -3468,7 +3469,7 @@
           <a:p>
             <a:fld id="{5913FB77-D8DB-4AB9-8EA5-EE8C3B57A5E1}" type="datetimeFigureOut">
               <a:rPr lang="en-GB" smtClean="0"/>
-              <a:t>17/01/2023</a:t>
+              <a:t>18/01/2023</a:t>
             </a:fld>
             <a:endParaRPr lang="en-GB" dirty="0"/>
           </a:p>
@@ -3993,104 +3994,6 @@
           </a:extLst>
         </p:spPr>
       </p:pic>
-      <p:sp>
-        <p:nvSpPr>
-          <p:cNvPr id="7" name="TextBox 6">
-            <a:extLst>
-              <a:ext uri="{FF2B5EF4-FFF2-40B4-BE49-F238E27FC236}">
-                <a16:creationId xmlns:a16="http://schemas.microsoft.com/office/drawing/2014/main" id="{441D6036-BCDA-4EC7-9653-F205FE226493}"/>
-              </a:ext>
-            </a:extLst>
-          </p:cNvPr>
-          <p:cNvSpPr txBox="1"/>
-          <p:nvPr/>
-        </p:nvSpPr>
-        <p:spPr>
-          <a:xfrm>
-            <a:off x="1092765" y="6231018"/>
-            <a:ext cx="6096000" cy="369332"/>
-          </a:xfrm>
-          <a:prstGeom prst="rect">
-            <a:avLst/>
-          </a:prstGeom>
-          <a:noFill/>
-        </p:spPr>
-        <p:txBody>
-          <a:bodyPr wrap="square">
-            <a:spAutoFit/>
-          </a:bodyPr>
-          <a:lstStyle/>
-          <a:p>
-            <a:r>
-              <a:rPr lang="en-GB" dirty="0"/>
-              <a:t>Open </a:t>
-            </a:r>
-            <a:r>
-              <a:rPr lang="en-GB" dirty="0">
-                <a:highlight>
-                  <a:srgbClr val="FFFF00"/>
-                </a:highlight>
-                <a:hlinkClick r:id="rId3"/>
-              </a:rPr>
-              <a:t>https://link</a:t>
-            </a:r>
-            <a:r>
-              <a:rPr lang="en-GB" dirty="0">
-                <a:highlight>
-                  <a:srgbClr val="FFFF00"/>
-                </a:highlight>
-              </a:rPr>
-              <a:t> </a:t>
-            </a:r>
-          </a:p>
-        </p:txBody>
-      </p:sp>
-      <p:sp>
-        <p:nvSpPr>
-          <p:cNvPr id="8" name="Arrow: Down 7">
-            <a:extLst>
-              <a:ext uri="{FF2B5EF4-FFF2-40B4-BE49-F238E27FC236}">
-                <a16:creationId xmlns:a16="http://schemas.microsoft.com/office/drawing/2014/main" id="{490697C4-1D52-44B3-9145-1E4126021820}"/>
-              </a:ext>
-            </a:extLst>
-          </p:cNvPr>
-          <p:cNvSpPr/>
-          <p:nvPr/>
-        </p:nvSpPr>
-        <p:spPr>
-          <a:xfrm rot="16200000">
-            <a:off x="410999" y="6105291"/>
-            <a:ext cx="469783" cy="620786"/>
-          </a:xfrm>
-          <a:prstGeom prst="downArrow">
-            <a:avLst/>
-          </a:prstGeom>
-        </p:spPr>
-        <p:style>
-          <a:lnRef idx="2">
-            <a:schemeClr val="accent1">
-              <a:shade val="50000"/>
-            </a:schemeClr>
-          </a:lnRef>
-          <a:fillRef idx="1">
-            <a:schemeClr val="accent1"/>
-          </a:fillRef>
-          <a:effectRef idx="0">
-            <a:schemeClr val="accent1"/>
-          </a:effectRef>
-          <a:fontRef idx="minor">
-            <a:schemeClr val="lt1"/>
-          </a:fontRef>
-        </p:style>
-        <p:txBody>
-          <a:bodyPr rtlCol="0" anchor="ctr"/>
-          <a:lstStyle/>
-          <a:p>
-            <a:pPr algn="ctr"/>
-            <a:endParaRPr lang="en-GB" dirty="0"/>
-          </a:p>
-        </p:txBody>
-      </p:sp>
     </p:spTree>
     <p:extLst>
       <p:ext uri="{BB962C8B-B14F-4D97-AF65-F5344CB8AC3E}">
@@ -4604,7 +4507,7 @@
           <a:graphicData uri="http://schemas.openxmlformats.org/presentationml/2006/ole">
             <mc:AlternateContent xmlns:mc="http://schemas.openxmlformats.org/markup-compatibility/2006">
               <mc:Choice xmlns:v="urn:schemas-microsoft-com:vml" Requires="v">
-                <p:oleObj spid="_x0000_s2058" name="Image" r:id="rId5" imgW="4926984" imgH="6171429" progId="Photoshop.Image.11">
+                <p:oleObj spid="_x0000_s2062" name="Image" r:id="rId5" imgW="4926984" imgH="6171429" progId="Photoshop.Image.11">
                   <p:embed/>
                 </p:oleObj>
               </mc:Choice>
@@ -4842,7 +4745,7 @@
           <a:graphicData uri="http://schemas.openxmlformats.org/presentationml/2006/ole">
             <mc:AlternateContent xmlns:mc="http://schemas.openxmlformats.org/markup-compatibility/2006">
               <mc:Choice xmlns:v="urn:schemas-microsoft-com:vml" Requires="v">
-                <p:oleObj spid="_x0000_s2059" name="Image" r:id="rId9" imgW="4926984" imgH="6171429" progId="Photoshop.Image.11">
+                <p:oleObj spid="_x0000_s2063" name="Image" r:id="rId9" imgW="4926984" imgH="6171429" progId="Photoshop.Image.11">
                   <p:embed/>
                 </p:oleObj>
               </mc:Choice>
@@ -5318,7 +5221,7 @@
           <a:graphicData uri="http://schemas.openxmlformats.org/presentationml/2006/ole">
             <mc:AlternateContent xmlns:mc="http://schemas.openxmlformats.org/markup-compatibility/2006">
               <mc:Choice xmlns:v="urn:schemas-microsoft-com:vml" Requires="v">
-                <p:oleObj spid="_x0000_s2060" name="Image" r:id="rId14" imgW="4926984" imgH="6171429" progId="Photoshop.Image.11">
+                <p:oleObj spid="_x0000_s2064" name="Image" r:id="rId14" imgW="4926984" imgH="6171429" progId="Photoshop.Image.11">
                   <p:embed/>
                 </p:oleObj>
               </mc:Choice>
@@ -5465,7 +5368,7 @@
           <a:graphicData uri="http://schemas.openxmlformats.org/presentationml/2006/ole">
             <mc:AlternateContent xmlns:mc="http://schemas.openxmlformats.org/markup-compatibility/2006">
               <mc:Choice xmlns:v="urn:schemas-microsoft-com:vml" Requires="v">
-                <p:oleObj spid="_x0000_s2061" name="Image" r:id="rId9" imgW="4926984" imgH="6171429" progId="Photoshop.Image.11">
+                <p:oleObj spid="_x0000_s2065" name="Image" r:id="rId9" imgW="4926984" imgH="6171429" progId="Photoshop.Image.11">
                   <p:embed/>
                 </p:oleObj>
               </mc:Choice>
@@ -9290,7 +9193,7 @@
           <a:graphicData uri="http://schemas.openxmlformats.org/presentationml/2006/ole">
             <mc:AlternateContent xmlns:mc="http://schemas.openxmlformats.org/markup-compatibility/2006">
               <mc:Choice xmlns:v="urn:schemas-microsoft-com:vml" Requires="v">
-                <p:oleObj spid="_x0000_s1030" name="Image" r:id="rId4" imgW="4926984" imgH="6171429" progId="Photoshop.Image.11">
+                <p:oleObj spid="_x0000_s1032" name="Image" r:id="rId4" imgW="4926984" imgH="6171429" progId="Photoshop.Image.11">
                   <p:embed/>
                 </p:oleObj>
               </mc:Choice>
@@ -9564,7 +9467,7 @@
           <a:graphicData uri="http://schemas.openxmlformats.org/presentationml/2006/ole">
             <mc:AlternateContent xmlns:mc="http://schemas.openxmlformats.org/markup-compatibility/2006">
               <mc:Choice xmlns:v="urn:schemas-microsoft-com:vml" Requires="v">
-                <p:oleObj spid="_x0000_s1031" name="Image" r:id="rId9" imgW="4926984" imgH="6171429" progId="Photoshop.Image.11">
+                <p:oleObj spid="_x0000_s1033" name="Image" r:id="rId9" imgW="4926984" imgH="6171429" progId="Photoshop.Image.11">
                   <p:embed/>
                 </p:oleObj>
               </mc:Choice>
@@ -10439,6 +10342,265 @@
     <p:extLst>
       <p:ext uri="{BB962C8B-B14F-4D97-AF65-F5344CB8AC3E}">
         <p14:creationId xmlns:p14="http://schemas.microsoft.com/office/powerpoint/2010/main" val="4286087962"/>
+      </p:ext>
+    </p:extLst>
+  </p:cSld>
+  <p:clrMapOvr>
+    <a:masterClrMapping/>
+  </p:clrMapOvr>
+</p:sld>
+</file>
+
+<file path=ppt/slides/slide20.xml><?xml version="1.0" encoding="utf-8"?>
+<p:sld xmlns:a="http://schemas.openxmlformats.org/drawingml/2006/main" xmlns:r="http://schemas.openxmlformats.org/officeDocument/2006/relationships" xmlns:p="http://schemas.openxmlformats.org/presentationml/2006/main">
+  <p:cSld>
+    <p:spTree>
+      <p:nvGrpSpPr>
+        <p:cNvPr id="1" name=""/>
+        <p:cNvGrpSpPr/>
+        <p:nvPr/>
+      </p:nvGrpSpPr>
+      <p:grpSpPr>
+        <a:xfrm>
+          <a:off x="0" y="0"/>
+          <a:ext cx="0" cy="0"/>
+          <a:chOff x="0" y="0"/>
+          <a:chExt cx="0" cy="0"/>
+        </a:xfrm>
+      </p:grpSpPr>
+      <p:sp>
+        <p:nvSpPr>
+          <p:cNvPr id="5" name="TextBox 4">
+            <a:extLst>
+              <a:ext uri="{FF2B5EF4-FFF2-40B4-BE49-F238E27FC236}">
+                <a16:creationId xmlns:a16="http://schemas.microsoft.com/office/drawing/2014/main" id="{3A7A1F5C-9C70-4DE3-BA39-7835B2935EB3}"/>
+              </a:ext>
+            </a:extLst>
+          </p:cNvPr>
+          <p:cNvSpPr txBox="1"/>
+          <p:nvPr/>
+        </p:nvSpPr>
+        <p:spPr>
+          <a:xfrm>
+            <a:off x="1138104" y="1569406"/>
+            <a:ext cx="9464530" cy="3539430"/>
+          </a:xfrm>
+          <a:prstGeom prst="rect">
+            <a:avLst/>
+          </a:prstGeom>
+          <a:noFill/>
+        </p:spPr>
+        <p:txBody>
+          <a:bodyPr wrap="square">
+            <a:spAutoFit/>
+          </a:bodyPr>
+          <a:lstStyle/>
+          <a:p>
+            <a:pPr marL="457200" indent="-457200">
+              <a:buFont typeface="Arial" panose="020B0604020202020204" pitchFamily="34" charset="0"/>
+              <a:buChar char="•"/>
+            </a:pPr>
+            <a:r>
+              <a:rPr lang="en-GB" sz="2800" dirty="0" err="1" smtClean="0">
+                <a:solidFill>
+                  <a:srgbClr val="0070C0"/>
+                </a:solidFill>
+              </a:rPr>
+              <a:t>Jupyter</a:t>
+            </a:r>
+            <a:r>
+              <a:rPr lang="en-GB" sz="2800" dirty="0" smtClean="0">
+                <a:solidFill>
+                  <a:srgbClr val="0070C0"/>
+                </a:solidFill>
+              </a:rPr>
+              <a:t> </a:t>
+            </a:r>
+            <a:r>
+              <a:rPr lang="en-GB" sz="2800" dirty="0">
+                <a:solidFill>
+                  <a:srgbClr val="0070C0"/>
+                </a:solidFill>
+              </a:rPr>
+              <a:t>Notebooks are useful tools to share analysis with non-programmers</a:t>
+            </a:r>
+          </a:p>
+          <a:p>
+            <a:pPr marL="457200" indent="-457200">
+              <a:buFont typeface="Arial" panose="020B0604020202020204" pitchFamily="34" charset="0"/>
+              <a:buChar char="•"/>
+            </a:pPr>
+            <a:endParaRPr lang="en-GB" sz="2800" dirty="0">
+              <a:solidFill>
+                <a:srgbClr val="0070C0"/>
+              </a:solidFill>
+            </a:endParaRPr>
+          </a:p>
+          <a:p>
+            <a:pPr marL="457200" indent="-457200">
+              <a:buFont typeface="Arial" panose="020B0604020202020204" pitchFamily="34" charset="0"/>
+              <a:buChar char="•"/>
+            </a:pPr>
+            <a:r>
+              <a:rPr lang="en-GB" sz="2800" dirty="0" smtClean="0">
+                <a:solidFill>
+                  <a:srgbClr val="0070C0"/>
+                </a:solidFill>
+              </a:rPr>
+              <a:t>One </a:t>
+            </a:r>
+            <a:r>
+              <a:rPr lang="en-GB" sz="2800" dirty="0">
+                <a:solidFill>
+                  <a:srgbClr val="0070C0"/>
+                </a:solidFill>
+              </a:rPr>
+              <a:t>single document can visualise background, results, formulae/code and metadata</a:t>
+            </a:r>
+          </a:p>
+          <a:p>
+            <a:pPr marL="457200" indent="-457200">
+              <a:buFont typeface="Arial" panose="020B0604020202020204" pitchFamily="34" charset="0"/>
+              <a:buChar char="•"/>
+            </a:pPr>
+            <a:endParaRPr lang="en-GB" sz="2800" dirty="0">
+              <a:solidFill>
+                <a:srgbClr val="0070C0"/>
+              </a:solidFill>
+            </a:endParaRPr>
+          </a:p>
+          <a:p>
+            <a:pPr marL="457200" indent="-457200">
+              <a:buFont typeface="Arial" panose="020B0604020202020204" pitchFamily="34" charset="0"/>
+              <a:buChar char="•"/>
+            </a:pPr>
+            <a:r>
+              <a:rPr lang="en-GB" sz="2800" dirty="0" smtClean="0">
+                <a:solidFill>
+                  <a:srgbClr val="0070C0"/>
+                </a:solidFill>
+              </a:rPr>
+              <a:t>One </a:t>
+            </a:r>
+            <a:r>
+              <a:rPr lang="en-GB" sz="2800" dirty="0">
+                <a:solidFill>
+                  <a:srgbClr val="0070C0"/>
+                </a:solidFill>
+              </a:rPr>
+              <a:t>single document helps to make your work more understandable, repeatable and shareable</a:t>
+            </a:r>
+            <a:endParaRPr lang="en-GB" sz="2800" dirty="0">
+              <a:solidFill>
+                <a:srgbClr val="0070C0"/>
+              </a:solidFill>
+            </a:endParaRPr>
+          </a:p>
+        </p:txBody>
+      </p:sp>
+      <p:pic>
+        <p:nvPicPr>
+          <p:cNvPr id="6" name="Picture 2" descr="Ed_DaSH">
+            <a:extLst>
+              <a:ext uri="{FF2B5EF4-FFF2-40B4-BE49-F238E27FC236}">
+                <a16:creationId xmlns:a16="http://schemas.microsoft.com/office/drawing/2014/main" id="{6F3CF586-06D2-46C3-A4A3-130E31C4A16F}"/>
+              </a:ext>
+            </a:extLst>
+          </p:cNvPr>
+          <p:cNvPicPr>
+            <a:picLocks noChangeAspect="1" noChangeArrowheads="1"/>
+          </p:cNvPicPr>
+          <p:nvPr/>
+        </p:nvPicPr>
+        <p:blipFill>
+          <a:blip r:embed="rId2" cstate="hqprint">
+            <a:extLst>
+              <a:ext uri="{28A0092B-C50C-407E-A947-70E740481C1C}">
+                <a14:useLocalDpi xmlns:a14="http://schemas.microsoft.com/office/drawing/2010/main" val="0"/>
+              </a:ext>
+            </a:extLst>
+          </a:blip>
+          <a:srcRect/>
+          <a:stretch>
+            <a:fillRect/>
+          </a:stretch>
+        </p:blipFill>
+        <p:spPr bwMode="auto">
+          <a:xfrm>
+            <a:off x="10820670" y="5458691"/>
+            <a:ext cx="1289214" cy="1325418"/>
+          </a:xfrm>
+          <a:prstGeom prst="rect">
+            <a:avLst/>
+          </a:prstGeom>
+          <a:noFill/>
+          <a:extLst>
+            <a:ext uri="{909E8E84-426E-40DD-AFC4-6F175D3DCCD1}">
+              <a14:hiddenFill xmlns:a14="http://schemas.microsoft.com/office/drawing/2010/main">
+                <a:solidFill>
+                  <a:srgbClr val="FFFFFF"/>
+                </a:solidFill>
+              </a14:hiddenFill>
+            </a:ext>
+          </a:extLst>
+        </p:spPr>
+      </p:pic>
+      <p:sp>
+        <p:nvSpPr>
+          <p:cNvPr id="4" name="Title 1">
+            <a:extLst>
+              <a:ext uri="{FF2B5EF4-FFF2-40B4-BE49-F238E27FC236}">
+                <a16:creationId xmlns:a16="http://schemas.microsoft.com/office/drawing/2014/main" id="{D21F9EF6-69ED-40F9-83C6-60B65781CE8B}"/>
+              </a:ext>
+            </a:extLst>
+          </p:cNvPr>
+          <p:cNvSpPr>
+            <a:spLocks noGrp="1"/>
+          </p:cNvSpPr>
+          <p:nvPr>
+            <p:ph type="title"/>
+          </p:nvPr>
+        </p:nvSpPr>
+        <p:spPr>
+          <a:xfrm>
+            <a:off x="838200" y="365125"/>
+            <a:ext cx="10515600" cy="587375"/>
+          </a:xfrm>
+        </p:spPr>
+        <p:txBody>
+          <a:bodyPr>
+            <a:normAutofit fontScale="90000"/>
+          </a:bodyPr>
+          <a:lstStyle/>
+          <a:p>
+            <a:r>
+              <a:rPr lang="pl-PL" dirty="0">
+                <a:solidFill>
+                  <a:srgbClr val="0070C0"/>
+                </a:solidFill>
+              </a:rPr>
+              <a:t>Computing in R and </a:t>
+            </a:r>
+            <a:r>
+              <a:rPr lang="pl-PL" dirty="0" err="1">
+                <a:solidFill>
+                  <a:srgbClr val="0070C0"/>
+                </a:solidFill>
+              </a:rPr>
+              <a:t>Python</a:t>
+            </a:r>
+            <a:endParaRPr lang="en-GB" dirty="0">
+              <a:solidFill>
+                <a:srgbClr val="0070C0"/>
+              </a:solidFill>
+            </a:endParaRPr>
+          </a:p>
+        </p:txBody>
+      </p:sp>
+    </p:spTree>
+    <p:extLst>
+      <p:ext uri="{BB962C8B-B14F-4D97-AF65-F5344CB8AC3E}">
+        <p14:creationId xmlns:p14="http://schemas.microsoft.com/office/powerpoint/2010/main" val="2625106964"/>
       </p:ext>
     </p:extLst>
   </p:cSld>

</xml_diff>